<commit_message>
kata_wasm_demo.pptx: Update "Why Kata Containers+UniKernel+WebAssembly-runtime?"
Signed-off-by: Hui Zhu <teawater@antgroup.com>
</commit_message>
<xml_diff>
--- a/kata_wasm_demo.pptx
+++ b/kata_wasm_demo.pptx
@@ -480,7 +480,7 @@
           <a:p>
             <a:fld id="{FC0C8FCD-2D04-4646-9EFD-9BC56E5162C1}" type="datetimeFigureOut">
               <a:rPr lang="en-US" smtClean="0"/>
-              <a:t>10/22/21</a:t>
+              <a:t>10/28/21</a:t>
             </a:fld>
             <a:endParaRPr lang="en-US"/>
           </a:p>
@@ -688,7 +688,7 @@
           <a:p>
             <a:fld id="{FC0C8FCD-2D04-4646-9EFD-9BC56E5162C1}" type="datetimeFigureOut">
               <a:rPr lang="en-US" smtClean="0"/>
-              <a:t>10/22/21</a:t>
+              <a:t>10/28/21</a:t>
             </a:fld>
             <a:endParaRPr lang="en-US"/>
           </a:p>
@@ -886,7 +886,7 @@
           <a:p>
             <a:fld id="{FC0C8FCD-2D04-4646-9EFD-9BC56E5162C1}" type="datetimeFigureOut">
               <a:rPr lang="en-US" smtClean="0"/>
-              <a:t>10/22/21</a:t>
+              <a:t>10/28/21</a:t>
             </a:fld>
             <a:endParaRPr lang="en-US"/>
           </a:p>
@@ -1173,7 +1173,7 @@
           <a:p>
             <a:fld id="{FC0C8FCD-2D04-4646-9EFD-9BC56E5162C1}" type="datetimeFigureOut">
               <a:rPr lang="en-US" smtClean="0"/>
-              <a:t>10/22/21</a:t>
+              <a:t>10/28/21</a:t>
             </a:fld>
             <a:endParaRPr lang="en-US"/>
           </a:p>
@@ -1438,7 +1438,7 @@
           <a:p>
             <a:fld id="{FC0C8FCD-2D04-4646-9EFD-9BC56E5162C1}" type="datetimeFigureOut">
               <a:rPr lang="en-US" smtClean="0"/>
-              <a:t>10/22/21</a:t>
+              <a:t>10/28/21</a:t>
             </a:fld>
             <a:endParaRPr lang="en-US"/>
           </a:p>
@@ -1850,7 +1850,7 @@
           <a:p>
             <a:fld id="{FC0C8FCD-2D04-4646-9EFD-9BC56E5162C1}" type="datetimeFigureOut">
               <a:rPr lang="en-US" smtClean="0"/>
-              <a:t>10/22/21</a:t>
+              <a:t>10/28/21</a:t>
             </a:fld>
             <a:endParaRPr lang="en-US"/>
           </a:p>
@@ -1991,7 +1991,7 @@
           <a:p>
             <a:fld id="{FC0C8FCD-2D04-4646-9EFD-9BC56E5162C1}" type="datetimeFigureOut">
               <a:rPr lang="en-US" smtClean="0"/>
-              <a:t>10/22/21</a:t>
+              <a:t>10/28/21</a:t>
             </a:fld>
             <a:endParaRPr lang="en-US"/>
           </a:p>
@@ -2104,7 +2104,7 @@
           <a:p>
             <a:fld id="{FC0C8FCD-2D04-4646-9EFD-9BC56E5162C1}" type="datetimeFigureOut">
               <a:rPr lang="en-US" smtClean="0"/>
-              <a:t>10/22/21</a:t>
+              <a:t>10/28/21</a:t>
             </a:fld>
             <a:endParaRPr lang="en-US"/>
           </a:p>
@@ -2415,7 +2415,7 @@
           <a:p>
             <a:fld id="{FC0C8FCD-2D04-4646-9EFD-9BC56E5162C1}" type="datetimeFigureOut">
               <a:rPr lang="en-US" smtClean="0"/>
-              <a:t>10/22/21</a:t>
+              <a:t>10/28/21</a:t>
             </a:fld>
             <a:endParaRPr lang="en-US"/>
           </a:p>
@@ -2706,7 +2706,7 @@
           <a:p>
             <a:fld id="{FC0C8FCD-2D04-4646-9EFD-9BC56E5162C1}" type="datetimeFigureOut">
               <a:rPr lang="en-US" smtClean="0"/>
-              <a:t>10/22/21</a:t>
+              <a:t>10/28/21</a:t>
             </a:fld>
             <a:endParaRPr lang="en-US"/>
           </a:p>
@@ -2956,7 +2956,7 @@
           <a:p>
             <a:fld id="{FC0C8FCD-2D04-4646-9EFD-9BC56E5162C1}" type="datetimeFigureOut">
               <a:rPr lang="en-US" smtClean="0"/>
-              <a:t>10/22/21</a:t>
+              <a:t>10/28/21</a:t>
             </a:fld>
             <a:endParaRPr lang="en-US"/>
           </a:p>
@@ -8773,9 +8773,51 @@
         <p:spPr/>
         <p:txBody>
           <a:bodyPr>
-            <a:normAutofit fontScale="92500" lnSpcReduction="10000"/>
+            <a:normAutofit fontScale="85000" lnSpcReduction="20000"/>
           </a:bodyPr>
           <a:lstStyle/>
+          <a:p>
+            <a:r>
+              <a:rPr lang="en-US" altLang="zh-CN" dirty="0"/>
+              <a:t>Because</a:t>
+            </a:r>
+            <a:r>
+              <a:rPr lang="en-US" altLang="zh-CN" dirty="0">
+                <a:solidFill>
+                  <a:schemeClr val="tx1"/>
+                </a:solidFill>
+              </a:rPr>
+              <a:t> WebAssembly-runtime </a:t>
+            </a:r>
+            <a:r>
+              <a:rPr lang="en-US" altLang="zh-CN" dirty="0"/>
+              <a:t>provides enough application level isolation, </a:t>
+            </a:r>
+            <a:r>
+              <a:rPr lang="en-US" altLang="zh-CN" dirty="0">
+                <a:solidFill>
+                  <a:schemeClr val="tx1"/>
+                </a:solidFill>
+              </a:rPr>
+              <a:t> UniKernel</a:t>
+            </a:r>
+            <a:r>
+              <a:rPr lang="en-US" altLang="zh-CN" dirty="0"/>
+              <a:t> and </a:t>
+            </a:r>
+            <a:r>
+              <a:rPr lang="en-US" altLang="zh-CN" dirty="0">
+                <a:solidFill>
+                  <a:schemeClr val="tx1"/>
+                </a:solidFill>
+              </a:rPr>
+              <a:t>WebAssembly-runtime </a:t>
+            </a:r>
+            <a:r>
+              <a:rPr lang="en-US" altLang="zh-CN" dirty="0"/>
+              <a:t>run in kernel mode (ring 0) together.  It helps to reduce the overhead of mode switching.</a:t>
+            </a:r>
+          </a:p>
           <a:p>
             <a:r>
               <a:rPr lang="en-US" altLang="zh-CN" dirty="0"/>
@@ -8796,18 +8838,10 @@
             <a:r>
               <a:rPr lang="en-US" altLang="zh-CN" dirty="0">
                 <a:solidFill>
-                  <a:srgbClr val="FF0000"/>
-                </a:solidFill>
-              </a:rPr>
-              <a:t>Kata </a:t>
-            </a:r>
-            <a:r>
-              <a:rPr lang="en-US" altLang="zh-CN" dirty="0">
-                <a:solidFill>
                   <a:schemeClr val="tx1"/>
                 </a:solidFill>
               </a:rPr>
-              <a:t>Containers</a:t>
+              <a:t>Kata Containers</a:t>
             </a:r>
             <a:r>
               <a:rPr lang="en-US" altLang="zh-CN" dirty="0"/>

</xml_diff>